<commit_message>
edited and inserted Geoff's backprop figures and captions
</commit_message>
<xml_diff>
--- a/bpfig_backward.pptx
+++ b/bpfig_backward.pptx
@@ -5151,6 +5151,14 @@
 <file path=ppt/slides/slide1.xml><?xml version="1.0" encoding="utf-8"?>
 <p:sld xmlns:a="http://schemas.openxmlformats.org/drawingml/2006/main" xmlns:r="http://schemas.openxmlformats.org/officeDocument/2006/relationships" xmlns:p="http://schemas.openxmlformats.org/presentationml/2006/main">
   <p:cSld>
+    <p:bg>
+      <p:bgPr>
+        <a:solidFill>
+          <a:srgbClr val="FFFFFE"/>
+        </a:solidFill>
+        <a:effectLst/>
+      </p:bgPr>
+    </p:bg>
     <p:spTree>
       <p:nvGrpSpPr>
         <p:cNvPr id="1" name=""/>
@@ -6678,11 +6686,7 @@
             </a:r>
             <a:r>
               <a:rPr lang="en-US" sz="2000" dirty="0" smtClean="0"/>
-              <a:t>derivatives</a:t>
-            </a:r>
-            <a:r>
-              <a:rPr lang="en-US" sz="2000" dirty="0" smtClean="0"/>
-              <a:t>  </a:t>
+              <a:t>derivatives  </a:t>
             </a:r>
             <a:endParaRPr lang="en-US" sz="2000" dirty="0"/>
           </a:p>
@@ -6710,7 +6714,7 @@
           <a:graphicData uri="http://schemas.openxmlformats.org/presentationml/2006/ole">
             <mc:AlternateContent xmlns:mc="http://schemas.openxmlformats.org/markup-compatibility/2006">
               <mc:Choice xmlns:v="urn:schemas-microsoft-com:vml" Requires="v">
-                <p:oleObj spid="_x0000_s176129" name="Equation" r:id="rId4" imgW="88900" imgH="165100" progId="Equation.3">
+                <p:oleObj spid="_x0000_s176140" name="Equation" r:id="rId4" imgW="88900" imgH="165100" progId="Equation.3">
                   <p:embed/>
                 </p:oleObj>
               </mc:Choice>
@@ -6767,7 +6771,7 @@
           <a:graphicData uri="http://schemas.openxmlformats.org/presentationml/2006/ole">
             <mc:AlternateContent xmlns:mc="http://schemas.openxmlformats.org/markup-compatibility/2006">
               <mc:Choice xmlns:v="urn:schemas-microsoft-com:vml" Requires="v">
-                <p:oleObj spid="_x0000_s176130" name="Equation" r:id="rId6" imgW="114300" imgH="190500" progId="Equation.3">
+                <p:oleObj spid="_x0000_s176141" name="Equation" r:id="rId6" imgW="114300" imgH="190500" progId="Equation.3">
                   <p:embed/>
                 </p:oleObj>
               </mc:Choice>
@@ -6824,7 +6828,7 @@
           <a:graphicData uri="http://schemas.openxmlformats.org/presentationml/2006/ole">
             <mc:AlternateContent xmlns:mc="http://schemas.openxmlformats.org/markup-compatibility/2006">
               <mc:Choice xmlns:v="urn:schemas-microsoft-com:vml" Requires="v">
-                <p:oleObj spid="_x0000_s176131" name="Equation" r:id="rId8" imgW="127000" imgH="177800" progId="Equation.3">
+                <p:oleObj spid="_x0000_s176142" name="Equation" r:id="rId8" imgW="127000" imgH="177800" progId="Equation.3">
                   <p:embed/>
                 </p:oleObj>
               </mc:Choice>
@@ -6881,7 +6885,7 @@
           <a:graphicData uri="http://schemas.openxmlformats.org/presentationml/2006/ole">
             <mc:AlternateContent xmlns:mc="http://schemas.openxmlformats.org/markup-compatibility/2006">
               <mc:Choice xmlns:v="urn:schemas-microsoft-com:vml" Requires="v">
-                <p:oleObj spid="_x0000_s176132" name="Equation" r:id="rId10" imgW="825500" imgH="876300" progId="Equation.3">
+                <p:oleObj spid="_x0000_s176143" name="Equation" r:id="rId10" imgW="825500" imgH="876300" progId="Equation.3">
                   <p:embed/>
                 </p:oleObj>
               </mc:Choice>
@@ -6938,7 +6942,7 @@
           <a:graphicData uri="http://schemas.openxmlformats.org/presentationml/2006/ole">
             <mc:AlternateContent xmlns:mc="http://schemas.openxmlformats.org/markup-compatibility/2006">
               <mc:Choice xmlns:v="urn:schemas-microsoft-com:vml" Requires="v">
-                <p:oleObj spid="_x0000_s176133" name="Equation" r:id="rId12" imgW="88900" imgH="177800" progId="Equation.3">
+                <p:oleObj spid="_x0000_s176144" name="Equation" r:id="rId12" imgW="88900" imgH="177800" progId="Equation.3">
                   <p:embed/>
                 </p:oleObj>
               </mc:Choice>
@@ -6995,7 +6999,7 @@
           <a:graphicData uri="http://schemas.openxmlformats.org/presentationml/2006/ole">
             <mc:AlternateContent xmlns:mc="http://schemas.openxmlformats.org/markup-compatibility/2006">
               <mc:Choice xmlns:v="urn:schemas-microsoft-com:vml" Requires="v">
-                <p:oleObj spid="_x0000_s176134" name="Equation" r:id="rId14" imgW="1168400" imgH="952500" progId="Equation.3">
+                <p:oleObj spid="_x0000_s176145" name="Equation" r:id="rId14" imgW="1168400" imgH="952500" progId="Equation.3">
                   <p:embed/>
                 </p:oleObj>
               </mc:Choice>
@@ -7052,7 +7056,7 @@
           <a:graphicData uri="http://schemas.openxmlformats.org/presentationml/2006/ole">
             <mc:AlternateContent xmlns:mc="http://schemas.openxmlformats.org/markup-compatibility/2006">
               <mc:Choice xmlns:v="urn:schemas-microsoft-com:vml" Requires="v">
-                <p:oleObj spid="_x0000_s176135" name="Equation" r:id="rId16" imgW="1117600" imgH="914400" progId="Equation.3">
+                <p:oleObj spid="_x0000_s176146" name="Equation" r:id="rId16" imgW="1117600" imgH="914400" progId="Equation.3">
                   <p:embed/>
                 </p:oleObj>
               </mc:Choice>
@@ -7109,7 +7113,7 @@
           <a:graphicData uri="http://schemas.openxmlformats.org/presentationml/2006/ole">
             <mc:AlternateContent xmlns:mc="http://schemas.openxmlformats.org/markup-compatibility/2006">
               <mc:Choice xmlns:v="urn:schemas-microsoft-com:vml" Requires="v">
-                <p:oleObj spid="_x0000_s176136" name="Equation" r:id="rId18" imgW="228600" imgH="215900" progId="Equation.3">
+                <p:oleObj spid="_x0000_s176147" name="Equation" r:id="rId18" imgW="228600" imgH="215900" progId="Equation.3">
                   <p:embed/>
                 </p:oleObj>
               </mc:Choice>
@@ -7166,7 +7170,7 @@
           <a:graphicData uri="http://schemas.openxmlformats.org/presentationml/2006/ole">
             <mc:AlternateContent xmlns:mc="http://schemas.openxmlformats.org/markup-compatibility/2006">
               <mc:Choice xmlns:v="urn:schemas-microsoft-com:vml" Requires="v">
-                <p:oleObj spid="_x0000_s176137" name="Equation" r:id="rId20" imgW="254000" imgH="228600" progId="Equation.3">
+                <p:oleObj spid="_x0000_s176148" name="Equation" r:id="rId20" imgW="254000" imgH="228600" progId="Equation.3">
                   <p:embed/>
                 </p:oleObj>
               </mc:Choice>
@@ -7223,7 +7227,7 @@
           <a:graphicData uri="http://schemas.openxmlformats.org/presentationml/2006/ole">
             <mc:AlternateContent xmlns:mc="http://schemas.openxmlformats.org/markup-compatibility/2006">
               <mc:Choice xmlns:v="urn:schemas-microsoft-com:vml" Requires="v">
-                <p:oleObj spid="_x0000_s176138" name="Equation" r:id="rId22" imgW="215900" imgH="228600" progId="Equation.3">
+                <p:oleObj spid="_x0000_s176149" name="Equation" r:id="rId22" imgW="215900" imgH="228600" progId="Equation.3">
                   <p:embed/>
                 </p:oleObj>
               </mc:Choice>

</xml_diff>